<commit_message>
Fix typos in 2017FA_ECE408_dl04_CNN02.pptx
</commit_message>
<xml_diff>
--- a/static/pptx/2017FA_ECE408_dl04_CNN02.pptx
+++ b/static/pptx/2017FA_ECE408_dl04_CNN02.pptx
@@ -326,7 +326,7 @@
                   <a:srgbClr val="F16322"/>
                 </a:solidFill>
               </a:rPr>
-              <a:t>11/1/2017</a:t>
+              <a:t>1/1/2018</a:t>
             </a:fld>
             <a:endParaRPr lang="en-US" dirty="0">
               <a:solidFill>
@@ -485,7 +485,7 @@
             <a:fld id="{DBF7D493-8EEB-7E45-916B-5FBC49ABC710}" type="datetimeFigureOut">
               <a:rPr lang="en-US" smtClean="0"/>
               <a:pPr/>
-              <a:t>11/1/2017</a:t>
+              <a:t>1/1/2018</a:t>
             </a:fld>
             <a:endParaRPr lang="en-US" dirty="0"/>
           </a:p>
@@ -8097,7 +8097,7 @@
                 <a:ea typeface="Times New Roman" panose="02020603050405020304" pitchFamily="18" charset="0"/>
                 <a:cs typeface="Times New Roman" panose="02020603050405020304" pitchFamily="18" charset="0"/>
               </a:rPr>
-              <a:t> h =  </a:t>
+              <a:t> h = </a:t>
             </a:r>
             <a:r>
               <a:rPr lang="en-US" sz="1800" dirty="0" err="1">
@@ -8798,37 +8798,37 @@
           <a:lstStyle/>
           <a:p>
             <a:r>
-              <a:rPr lang="en-US" dirty="0"/>
+              <a:rPr lang="en-US" sz="4000" dirty="0"/>
               <a:t>The amount of parallelism is quite high as long as the total number of pixels across all output feature maps is large</a:t>
             </a:r>
           </a:p>
           <a:p>
             <a:pPr lvl="1"/>
             <a:r>
-              <a:rPr lang="en-US" dirty="0"/>
+              <a:rPr lang="en-US" sz="3200" dirty="0"/>
               <a:t>This matches the CNN architecture well</a:t>
             </a:r>
           </a:p>
           <a:p>
             <a:r>
-              <a:rPr lang="en-US" dirty="0"/>
+              <a:rPr lang="en-US" sz="4000" dirty="0"/>
               <a:t>Each input tile is loaded multiple times, once for each block that calculates the output tile that requires the input tile</a:t>
             </a:r>
           </a:p>
           <a:p>
             <a:pPr lvl="1"/>
             <a:r>
-              <a:rPr lang="en-US" dirty="0"/>
+              <a:rPr lang="en-US" sz="3200" dirty="0"/>
               <a:t>Not very efficient in global memory </a:t>
             </a:r>
             <a:r>
-              <a:rPr lang="en-US" dirty="0" err="1"/>
+              <a:rPr lang="en-US" sz="3200" dirty="0" err="1"/>
               <a:t>bandwith</a:t>
             </a:r>
-            <a:endParaRPr lang="en-US" dirty="0"/>
+            <a:endParaRPr lang="en-US" sz="3200" dirty="0"/>
           </a:p>
           <a:p>
-            <a:endParaRPr lang="en-US" dirty="0"/>
+            <a:endParaRPr lang="en-US" sz="4000" dirty="0"/>
           </a:p>
         </p:txBody>
       </p:sp>
@@ -9481,7 +9481,7 @@
           <a:graphicData uri="http://schemas.openxmlformats.org/presentationml/2006/ole">
             <mc:AlternateContent xmlns:mc="http://schemas.openxmlformats.org/markup-compatibility/2006">
               <mc:Choice xmlns:v="urn:schemas-microsoft-com:vml" Requires="v">
-                <p:oleObj spid="_x0000_s1054" r:id="rId3" imgW="7772400" imgH="8705940" progId="Visio.Drawing.11">
+                <p:oleObj spid="_x0000_s1057" r:id="rId3" imgW="7772400" imgH="8705940" progId="Visio.Drawing.11">
                   <p:embed/>
                 </p:oleObj>
               </mc:Choice>
@@ -18406,7 +18406,54 @@
             <a:pPr lvl="1"/>
             <a:r>
               <a:rPr lang="en-US" sz="2400" dirty="0"/>
-              <a:t>The total number of elements in each original input feature map is (H_out-K+1) * (W*out-K+1)</a:t>
+              <a:t>The total number of elements in each original input feature map </a:t>
+            </a:r>
+            <a:r>
+              <a:rPr lang="en-US" sz="2400"/>
+              <a:t>is </a:t>
+            </a:r>
+            <a:br>
+              <a:rPr lang="en-US" sz="2400"/>
+            </a:br>
+            <a:r>
+              <a:rPr lang="en-US" sz="2400"/>
+              <a:t>(</a:t>
+            </a:r>
+            <a:r>
+              <a:rPr lang="en-US" sz="2400" dirty="0"/>
+              <a:t>H</a:t>
+            </a:r>
+            <a:r>
+              <a:rPr lang="en-US" sz="2400"/>
+              <a:t>_out+K</a:t>
+            </a:r>
+            <a:r>
+              <a:rPr lang="en-US" sz="2400" dirty="0"/>
+              <a:t>-</a:t>
+            </a:r>
+            <a:r>
+              <a:rPr lang="en-US" sz="2400"/>
+              <a:t>1</a:t>
+            </a:r>
+            <a:r>
+              <a:rPr lang="en-US" sz="2400" dirty="0"/>
+              <a:t>) * </a:t>
+            </a:r>
+            <a:r>
+              <a:rPr lang="en-US" sz="2400"/>
+              <a:t>(W_out+K</a:t>
+            </a:r>
+            <a:r>
+              <a:rPr lang="en-US" sz="2400" dirty="0"/>
+              <a:t>-</a:t>
+            </a:r>
+            <a:r>
+              <a:rPr lang="en-US" sz="2400"/>
+              <a:t>1</a:t>
+            </a:r>
+            <a:r>
+              <a:rPr lang="en-US" sz="2400" dirty="0"/>
+              <a:t>)</a:t>
             </a:r>
             <a:endParaRPr lang="en-US" dirty="0"/>
           </a:p>
@@ -18468,7 +18515,7 @@
           <a:graphicData uri="http://schemas.openxmlformats.org/presentationml/2006/ole">
             <mc:AlternateContent xmlns:mc="http://schemas.openxmlformats.org/markup-compatibility/2006">
               <mc:Choice xmlns:v="urn:schemas-microsoft-com:vml" Requires="v">
-                <p:oleObj spid="_x0000_s4101" r:id="rId3" imgW="7772400" imgH="8705940" progId="Visio.Drawing.11">
+                <p:oleObj spid="_x0000_s4104" r:id="rId3" imgW="7772400" imgH="8705940" progId="Visio.Drawing.11">
                   <p:embed/>
                 </p:oleObj>
               </mc:Choice>
@@ -19036,7 +19083,7 @@
                 <a:latin typeface="Consolas" panose="020B0609020204030204" pitchFamily="49" charset="0"/>
                 <a:ea typeface="Times New Roman" panose="02020603050405020304" pitchFamily="18" charset="0"/>
               </a:rPr>
-              <a:t>          Y[m, h, w] = 0;</a:t>
+              <a:t>          Y[b, m, h, w] = 0;</a:t>
             </a:r>
           </a:p>
           <a:p>
@@ -19414,7 +19461,7 @@
           <a:graphicData uri="http://schemas.openxmlformats.org/presentationml/2006/ole">
             <mc:AlternateContent xmlns:mc="http://schemas.openxmlformats.org/markup-compatibility/2006">
               <mc:Choice xmlns:v="urn:schemas-microsoft-com:vml" Requires="v">
-                <p:oleObj spid="_x0000_s3094" r:id="rId3" imgW="7772400" imgH="8705940" progId="Visio.Drawing.11">
+                <p:oleObj spid="_x0000_s3097" r:id="rId3" imgW="7772400" imgH="8705940" progId="Visio.Drawing.11">
                   <p:embed/>
                 </p:oleObj>
               </mc:Choice>

</xml_diff>